<commit_message>
working on the librarian side still on the process
</commit_message>
<xml_diff>
--- a/MilestoneI presentation format.pptx
+++ b/MilestoneI presentation format.pptx
@@ -2763,8 +2763,8 @@
         </p:nvSpPr>
         <p:spPr>
           <a:xfrm>
-            <a:off x="838080" y="365040"/>
-            <a:ext cx="10514880" cy="1324800"/>
+            <a:off x="609480" y="273600"/>
+            <a:ext cx="10972080" cy="1144440"/>
           </a:xfrm>
           <a:prstGeom prst="rect">
             <a:avLst/>
@@ -2800,7 +2800,7 @@
         <p:spPr>
           <a:xfrm>
             <a:off x="609480" y="1604520"/>
-            <a:ext cx="10972440" cy="3977280"/>
+            <a:ext cx="10972080" cy="3976920"/>
           </a:xfrm>
           <a:prstGeom prst="rect">
             <a:avLst/>
@@ -2823,12 +2823,12 @@
               <a:buChar char=""/>
             </a:pPr>
             <a:r>
-              <a:rPr b="0" lang="en-US" sz="3200" spc="-1" strike="noStrike">
+              <a:rPr b="0" lang="en-US" sz="1800" spc="-1" strike="noStrike">
                 <a:latin typeface="Arial"/>
               </a:rPr>
               <a:t>Click to edit the outline text format</a:t>
             </a:r>
-            <a:endParaRPr b="0" lang="en-US" sz="3200" spc="-1" strike="noStrike">
+            <a:endParaRPr b="0" lang="en-US" sz="1800" spc="-1" strike="noStrike">
               <a:latin typeface="Arial"/>
             </a:endParaRPr>
           </a:p>
@@ -2845,12 +2845,12 @@
               <a:buChar char=""/>
             </a:pPr>
             <a:r>
-              <a:rPr b="0" lang="en-US" sz="2800" spc="-1" strike="noStrike">
+              <a:rPr b="0" lang="en-US" sz="1800" spc="-1" strike="noStrike">
                 <a:latin typeface="Arial"/>
               </a:rPr>
               <a:t>Second Outline Level</a:t>
             </a:r>
-            <a:endParaRPr b="0" lang="en-US" sz="2800" spc="-1" strike="noStrike">
+            <a:endParaRPr b="0" lang="en-US" sz="1800" spc="-1" strike="noStrike">
               <a:latin typeface="Arial"/>
             </a:endParaRPr>
           </a:p>
@@ -2867,12 +2867,12 @@
               <a:buChar char=""/>
             </a:pPr>
             <a:r>
-              <a:rPr b="0" lang="en-US" sz="2400" spc="-1" strike="noStrike">
+              <a:rPr b="0" lang="en-US" sz="1800" spc="-1" strike="noStrike">
                 <a:latin typeface="Arial"/>
               </a:rPr>
               <a:t>Third Outline Level</a:t>
             </a:r>
-            <a:endParaRPr b="0" lang="en-US" sz="2400" spc="-1" strike="noStrike">
+            <a:endParaRPr b="0" lang="en-US" sz="1800" spc="-1" strike="noStrike">
               <a:latin typeface="Arial"/>
             </a:endParaRPr>
           </a:p>
@@ -2889,12 +2889,12 @@
               <a:buChar char=""/>
             </a:pPr>
             <a:r>
-              <a:rPr b="0" lang="en-US" sz="2000" spc="-1" strike="noStrike">
+              <a:rPr b="0" lang="en-US" sz="1800" spc="-1" strike="noStrike">
                 <a:latin typeface="Arial"/>
               </a:rPr>
               <a:t>Fourth Outline Level</a:t>
             </a:r>
-            <a:endParaRPr b="0" lang="en-US" sz="2000" spc="-1" strike="noStrike">
+            <a:endParaRPr b="0" lang="en-US" sz="1800" spc="-1" strike="noStrike">
               <a:latin typeface="Arial"/>
             </a:endParaRPr>
           </a:p>
@@ -2911,12 +2911,12 @@
               <a:buChar char=""/>
             </a:pPr>
             <a:r>
-              <a:rPr b="0" lang="en-US" sz="2000" spc="-1" strike="noStrike">
+              <a:rPr b="0" lang="en-US" sz="1800" spc="-1" strike="noStrike">
                 <a:latin typeface="Arial"/>
               </a:rPr>
               <a:t>Fifth Outline Level</a:t>
             </a:r>
-            <a:endParaRPr b="0" lang="en-US" sz="2000" spc="-1" strike="noStrike">
+            <a:endParaRPr b="0" lang="en-US" sz="1800" spc="-1" strike="noStrike">
               <a:latin typeface="Arial"/>
             </a:endParaRPr>
           </a:p>
@@ -2933,12 +2933,12 @@
               <a:buChar char=""/>
             </a:pPr>
             <a:r>
-              <a:rPr b="0" lang="en-US" sz="2000" spc="-1" strike="noStrike">
+              <a:rPr b="0" lang="en-US" sz="1800" spc="-1" strike="noStrike">
                 <a:latin typeface="Arial"/>
               </a:rPr>
               <a:t>Sixth Outline Level</a:t>
             </a:r>
-            <a:endParaRPr b="0" lang="en-US" sz="2000" spc="-1" strike="noStrike">
+            <a:endParaRPr b="0" lang="en-US" sz="1800" spc="-1" strike="noStrike">
               <a:latin typeface="Arial"/>
             </a:endParaRPr>
           </a:p>
@@ -2955,12 +2955,12 @@
               <a:buChar char=""/>
             </a:pPr>
             <a:r>
-              <a:rPr b="0" lang="en-US" sz="2000" spc="-1" strike="noStrike">
+              <a:rPr b="0" lang="en-US" sz="1800" spc="-1" strike="noStrike">
                 <a:latin typeface="Arial"/>
               </a:rPr>
               <a:t>Seventh Outline Level</a:t>
             </a:r>
-            <a:endParaRPr b="0" lang="en-US" sz="2000" spc="-1" strike="noStrike">
+            <a:endParaRPr b="0" lang="en-US" sz="1800" spc="-1" strike="noStrike">
               <a:latin typeface="Arial"/>
             </a:endParaRPr>
           </a:p>
@@ -3272,7 +3272,7 @@
         <p:spPr>
           <a:xfrm>
             <a:off x="1523880" y="1122480"/>
-            <a:ext cx="9143280" cy="2386800"/>
+            <a:ext cx="9142920" cy="2386440"/>
           </a:xfrm>
           <a:prstGeom prst="rect">
             <a:avLst/>
@@ -3304,6 +3304,7 @@
                   <a:srgbClr val="000000"/>
                 </a:solidFill>
                 <a:latin typeface="Calibri Light"/>
+                <a:ea typeface="DejaVu Sans"/>
               </a:rPr>
               <a:t>DigiBook</a:t>
             </a:r>
@@ -3322,7 +3323,7 @@
         <p:spPr>
           <a:xfrm>
             <a:off x="1523880" y="3602160"/>
-            <a:ext cx="9143280" cy="1654920"/>
+            <a:ext cx="9142920" cy="1654560"/>
           </a:xfrm>
           <a:prstGeom prst="rect">
             <a:avLst/>
@@ -3360,6 +3361,7 @@
                   <a:srgbClr val="000000"/>
                 </a:solidFill>
                 <a:latin typeface="Calibri"/>
+                <a:ea typeface="DejaVu Sans"/>
               </a:rPr>
               <a:t>Group 12</a:t>
             </a:r>
@@ -3385,6 +3387,7 @@
                   <a:srgbClr val="000000"/>
                 </a:solidFill>
                 <a:latin typeface="Calibri"/>
+                <a:ea typeface="DejaVu Sans"/>
               </a:rPr>
               <a:t>Baraka Danny 18J01ACS005</a:t>
             </a:r>
@@ -3410,6 +3413,7 @@
                   <a:srgbClr val="000000"/>
                 </a:solidFill>
                 <a:latin typeface="Calibri"/>
+                <a:ea typeface="DejaVu Sans"/>
               </a:rPr>
               <a:t>Hillier Nyale 19S01ABT021</a:t>
             </a:r>
@@ -3435,6 +3439,7 @@
                   <a:srgbClr val="000000"/>
                 </a:solidFill>
                 <a:latin typeface="Calibri"/>
+                <a:ea typeface="DejaVu Sans"/>
               </a:rPr>
               <a:t>Meshack Joseph 18S01ABA034</a:t>
             </a:r>
@@ -3499,7 +3504,7 @@
         <p:spPr>
           <a:xfrm>
             <a:off x="838080" y="365040"/>
-            <a:ext cx="10514880" cy="1324800"/>
+            <a:ext cx="10514520" cy="1324440"/>
           </a:xfrm>
           <a:prstGeom prst="rect">
             <a:avLst/>
@@ -3531,6 +3536,7 @@
                   <a:srgbClr val="000000"/>
                 </a:solidFill>
                 <a:latin typeface="Calibri Light"/>
+                <a:ea typeface="DejaVu Sans"/>
               </a:rPr>
               <a:t>Problem Statement</a:t>
             </a:r>
@@ -3549,7 +3555,7 @@
         <p:spPr>
           <a:xfrm>
             <a:off x="838080" y="1825560"/>
-            <a:ext cx="10514880" cy="4350600"/>
+            <a:ext cx="10514520" cy="4350240"/>
           </a:xfrm>
           <a:prstGeom prst="rect">
             <a:avLst/>
@@ -3570,7 +3576,7 @@
             <a:noAutofit/>
           </a:bodyPr>
           <a:p>
-            <a:pPr marL="228600" indent="-227880">
+            <a:pPr marL="228600" indent="-227520">
               <a:lnSpc>
                 <a:spcPct val="90000"/>
               </a:lnSpc>
@@ -3589,6 +3595,63 @@
                   <a:srgbClr val="000000"/>
                 </a:solidFill>
                 <a:latin typeface="Calibri"/>
+                <a:ea typeface="DejaVu Sans"/>
+              </a:rPr>
+              <a:t>Here’s the problem we are trying to solve and a solution proposed to it:</a:t>
+            </a:r>
+            <a:endParaRPr b="0" lang="en-US" sz="2800" spc="-1" strike="noStrike">
+              <a:latin typeface="Arial"/>
+            </a:endParaRPr>
+          </a:p>
+          <a:p>
+            <a:pPr marL="228600" indent="-227520">
+              <a:lnSpc>
+                <a:spcPct val="90000"/>
+              </a:lnSpc>
+              <a:spcBef>
+                <a:spcPts val="1001"/>
+              </a:spcBef>
+              <a:buClr>
+                <a:srgbClr val="000000"/>
+              </a:buClr>
+              <a:buFont typeface="Arial"/>
+              <a:buChar char="•"/>
+            </a:pPr>
+            <a:r>
+              <a:rPr b="0" lang="en-US" sz="2800" spc="-1" strike="noStrike">
+                <a:solidFill>
+                  <a:srgbClr val="000000"/>
+                </a:solidFill>
+                <a:latin typeface="Calibri"/>
+                <a:ea typeface="DejaVu Sans"/>
+              </a:rPr>
+              <a:t>People have been having issues to find the right resource for reading due to the multiple resources available online. </a:t>
+            </a:r>
+            <a:endParaRPr b="0" lang="en-US" sz="2800" spc="-1" strike="noStrike">
+              <a:latin typeface="Arial"/>
+            </a:endParaRPr>
+          </a:p>
+          <a:p>
+            <a:pPr marL="228600" indent="-227520">
+              <a:lnSpc>
+                <a:spcPct val="90000"/>
+              </a:lnSpc>
+              <a:spcBef>
+                <a:spcPts val="1001"/>
+              </a:spcBef>
+              <a:buClr>
+                <a:srgbClr val="000000"/>
+              </a:buClr>
+              <a:buFont typeface="Arial"/>
+              <a:buChar char="•"/>
+            </a:pPr>
+            <a:r>
+              <a:rPr b="0" lang="en-US" sz="2800" spc="-1" strike="noStrike">
+                <a:solidFill>
+                  <a:srgbClr val="000000"/>
+                </a:solidFill>
+                <a:latin typeface="Calibri"/>
+                <a:ea typeface="DejaVu Sans"/>
               </a:rPr>
               <a:t> </a:t>
             </a:r>
@@ -3598,8 +3661,47 @@
                   <a:srgbClr val="000000"/>
                 </a:solidFill>
                 <a:latin typeface="Calibri"/>
+                <a:ea typeface="DejaVu Sans"/>
               </a:rPr>
-              <a:t>A digital Library is a collection of information that is stored and accessed electronically. The information stored in the library should Have a topic common to all the data. It has to provide a central location for accessing information on a particular topic. The user wants to have an overview and well described summary before downloading a book. </a:t>
+              <a:t>Due to the number of people who read increasing each day, physical libraries are not enough anymore due to limited resources (books) and places inside them.</a:t>
+            </a:r>
+            <a:endParaRPr b="0" lang="en-US" sz="2800" spc="-1" strike="noStrike">
+              <a:latin typeface="Arial"/>
+            </a:endParaRPr>
+          </a:p>
+          <a:p>
+            <a:pPr marL="228600" indent="-227520">
+              <a:lnSpc>
+                <a:spcPct val="90000"/>
+              </a:lnSpc>
+              <a:spcBef>
+                <a:spcPts val="1001"/>
+              </a:spcBef>
+              <a:buClr>
+                <a:srgbClr val="000000"/>
+              </a:buClr>
+              <a:buFont typeface="Arial"/>
+              <a:buChar char="•"/>
+            </a:pPr>
+            <a:r>
+              <a:rPr b="0" lang="en-US" sz="2800" spc="-1" strike="noStrike">
+                <a:solidFill>
+                  <a:srgbClr val="000000"/>
+                </a:solidFill>
+                <a:latin typeface="Calibri"/>
+                <a:ea typeface="DejaVu Sans"/>
+              </a:rPr>
+              <a:t> </a:t>
+            </a:r>
+            <a:r>
+              <a:rPr b="0" lang="en-US" sz="2800" spc="-1" strike="noStrike">
+                <a:solidFill>
+                  <a:srgbClr val="000000"/>
+                </a:solidFill>
+                <a:latin typeface="Calibri"/>
+                <a:ea typeface="DejaVu Sans"/>
+              </a:rPr>
+              <a:t>Proposed solution: The idea is to come up with a digital library that can be accessible to an unlimited number of users.</a:t>
             </a:r>
             <a:endParaRPr b="0" lang="en-US" sz="2800" spc="-1" strike="noStrike">
               <a:latin typeface="Arial"/>
@@ -3646,7 +3748,7 @@
         <p:spPr>
           <a:xfrm>
             <a:off x="838080" y="365040"/>
-            <a:ext cx="10514880" cy="1324800"/>
+            <a:ext cx="10514520" cy="1324440"/>
           </a:xfrm>
           <a:prstGeom prst="rect">
             <a:avLst/>
@@ -3678,6 +3780,7 @@
                   <a:srgbClr val="000000"/>
                 </a:solidFill>
                 <a:latin typeface="Calibri Light"/>
+                <a:ea typeface="DejaVu Sans"/>
               </a:rPr>
               <a:t>Objectives</a:t>
             </a:r>
@@ -3696,7 +3799,7 @@
         <p:spPr>
           <a:xfrm>
             <a:off x="838080" y="1825560"/>
-            <a:ext cx="10514880" cy="4350600"/>
+            <a:ext cx="10514520" cy="4350240"/>
           </a:xfrm>
           <a:prstGeom prst="rect">
             <a:avLst/>
@@ -3717,7 +3820,7 @@
             <a:noAutofit/>
           </a:bodyPr>
           <a:p>
-            <a:pPr marL="228600" indent="-227880">
+            <a:pPr marL="228600" indent="-227520">
               <a:lnSpc>
                 <a:spcPct val="90000"/>
               </a:lnSpc>
@@ -3736,15 +3839,16 @@
                   <a:srgbClr val="000000"/>
                 </a:solidFill>
                 <a:latin typeface="Calibri"/>
+                <a:ea typeface="DejaVu Sans"/>
               </a:rPr>
-              <a:t>Enable users and Librarians to register and Login</a:t>
+              <a:t>Enable users and Librarians and Login</a:t>
             </a:r>
             <a:endParaRPr b="0" lang="en-US" sz="2800" spc="-1" strike="noStrike">
               <a:latin typeface="Arial"/>
             </a:endParaRPr>
           </a:p>
           <a:p>
-            <a:pPr marL="228600" indent="-227880">
+            <a:pPr marL="228600" indent="-227520">
               <a:lnSpc>
                 <a:spcPct val="90000"/>
               </a:lnSpc>
@@ -3763,6 +3867,7 @@
                   <a:srgbClr val="000000"/>
                 </a:solidFill>
                 <a:latin typeface="Calibri"/>
+                <a:ea typeface="DejaVu Sans"/>
               </a:rPr>
               <a:t>Enable user to read summary of a book before downloading it, and also to review the book</a:t>
             </a:r>
@@ -3771,7 +3876,7 @@
             </a:endParaRPr>
           </a:p>
           <a:p>
-            <a:pPr marL="228600" indent="-227880">
+            <a:pPr marL="228600" indent="-227520">
               <a:lnSpc>
                 <a:spcPct val="90000"/>
               </a:lnSpc>
@@ -3790,6 +3895,7 @@
                   <a:srgbClr val="000000"/>
                 </a:solidFill>
                 <a:latin typeface="Calibri"/>
+                <a:ea typeface="DejaVu Sans"/>
               </a:rPr>
               <a:t>Enable users to search for books.</a:t>
             </a:r>
@@ -3798,7 +3904,7 @@
             </a:endParaRPr>
           </a:p>
           <a:p>
-            <a:pPr marL="228600" indent="-227880">
+            <a:pPr marL="228600" indent="-227520">
               <a:lnSpc>
                 <a:spcPct val="90000"/>
               </a:lnSpc>
@@ -3817,6 +3923,7 @@
                   <a:srgbClr val="000000"/>
                 </a:solidFill>
                 <a:latin typeface="Calibri"/>
+                <a:ea typeface="DejaVu Sans"/>
               </a:rPr>
               <a:t>Enable Librarians to add books and their descriptions.</a:t>
             </a:r>
@@ -3825,7 +3932,7 @@
             </a:endParaRPr>
           </a:p>
           <a:p>
-            <a:pPr marL="228600" indent="-227880">
+            <a:pPr marL="228600" indent="-227520">
               <a:lnSpc>
                 <a:spcPct val="90000"/>
               </a:lnSpc>
@@ -3844,9 +3951,23 @@
                   <a:srgbClr val="000000"/>
                 </a:solidFill>
                 <a:latin typeface="Calibri"/>
+                <a:ea typeface="DejaVu Sans"/>
               </a:rPr>
               <a:t>Enable the admin to get a full report of what is on the platform.</a:t>
             </a:r>
+            <a:endParaRPr b="0" lang="en-US" sz="2800" spc="-1" strike="noStrike">
+              <a:latin typeface="Arial"/>
+            </a:endParaRPr>
+          </a:p>
+          <a:p>
+            <a:pPr>
+              <a:lnSpc>
+                <a:spcPct val="90000"/>
+              </a:lnSpc>
+              <a:spcBef>
+                <a:spcPts val="1001"/>
+              </a:spcBef>
+            </a:pPr>
             <a:endParaRPr b="0" lang="en-US" sz="2800" spc="-1" strike="noStrike">
               <a:latin typeface="Arial"/>
             </a:endParaRPr>

</xml_diff>